<commit_message>
Fix a number of typos
</commit_message>
<xml_diff>
--- a/poster/eswc2014-poster.pptx
+++ b/poster/eswc2014-poster.pptx
@@ -288,7 +288,8 @@
           <a:p>
             <a:fld id="{AB3B3CD4-9605-4B16-ADF1-526C2BC53AE0}" type="datetimeFigureOut">
               <a:rPr lang="en-US" smtClean="0"/>
-              <a:t>20/05/2014</a:t>
+              <a:pPr/>
+              <a:t>5/20/2014</a:t>
             </a:fld>
             <a:endParaRPr lang="en-US"/>
           </a:p>
@@ -330,7 +331,8 @@
           <a:p>
             <a:fld id="{B416F5F1-DF15-4BE7-AEFB-601359FCFF9B}" type="slidenum">
               <a:rPr lang="en-US" smtClean="0"/>
-              <a:t>‹Nr.›</a:t>
+              <a:pPr/>
+              <a:t>‹#›</a:t>
             </a:fld>
             <a:endParaRPr lang="en-US"/>
           </a:p>
@@ -339,7 +341,7 @@
     </p:spTree>
     <p:extLst>
       <p:ext uri="{BB962C8B-B14F-4D97-AF65-F5344CB8AC3E}">
-        <p14:creationId xmlns:p14="http://schemas.microsoft.com/office/powerpoint/2010/main" val="3498610242"/>
+        <p14:creationId xmlns:p14="http://schemas.microsoft.com/office/powerpoint/2010/main" xmlns="" val="3498610242"/>
       </p:ext>
     </p:extLst>
   </p:cSld>
@@ -458,7 +460,8 @@
           <a:p>
             <a:fld id="{AB3B3CD4-9605-4B16-ADF1-526C2BC53AE0}" type="datetimeFigureOut">
               <a:rPr lang="en-US" smtClean="0"/>
-              <a:t>20/05/2014</a:t>
+              <a:pPr/>
+              <a:t>5/20/2014</a:t>
             </a:fld>
             <a:endParaRPr lang="en-US"/>
           </a:p>
@@ -500,7 +503,8 @@
           <a:p>
             <a:fld id="{B416F5F1-DF15-4BE7-AEFB-601359FCFF9B}" type="slidenum">
               <a:rPr lang="en-US" smtClean="0"/>
-              <a:t>‹Nr.›</a:t>
+              <a:pPr/>
+              <a:t>‹#›</a:t>
             </a:fld>
             <a:endParaRPr lang="en-US"/>
           </a:p>
@@ -509,7 +513,7 @@
     </p:spTree>
     <p:extLst>
       <p:ext uri="{BB962C8B-B14F-4D97-AF65-F5344CB8AC3E}">
-        <p14:creationId xmlns:p14="http://schemas.microsoft.com/office/powerpoint/2010/main" val="3408886510"/>
+        <p14:creationId xmlns:p14="http://schemas.microsoft.com/office/powerpoint/2010/main" xmlns="" val="3408886510"/>
       </p:ext>
     </p:extLst>
   </p:cSld>
@@ -638,7 +642,8 @@
           <a:p>
             <a:fld id="{AB3B3CD4-9605-4B16-ADF1-526C2BC53AE0}" type="datetimeFigureOut">
               <a:rPr lang="en-US" smtClean="0"/>
-              <a:t>20/05/2014</a:t>
+              <a:pPr/>
+              <a:t>5/20/2014</a:t>
             </a:fld>
             <a:endParaRPr lang="en-US"/>
           </a:p>
@@ -680,7 +685,8 @@
           <a:p>
             <a:fld id="{B416F5F1-DF15-4BE7-AEFB-601359FCFF9B}" type="slidenum">
               <a:rPr lang="en-US" smtClean="0"/>
-              <a:t>‹Nr.›</a:t>
+              <a:pPr/>
+              <a:t>‹#›</a:t>
             </a:fld>
             <a:endParaRPr lang="en-US"/>
           </a:p>
@@ -689,7 +695,7 @@
     </p:spTree>
     <p:extLst>
       <p:ext uri="{BB962C8B-B14F-4D97-AF65-F5344CB8AC3E}">
-        <p14:creationId xmlns:p14="http://schemas.microsoft.com/office/powerpoint/2010/main" val="3220719012"/>
+        <p14:creationId xmlns:p14="http://schemas.microsoft.com/office/powerpoint/2010/main" xmlns="" val="3220719012"/>
       </p:ext>
     </p:extLst>
   </p:cSld>
@@ -808,7 +814,8 @@
           <a:p>
             <a:fld id="{AB3B3CD4-9605-4B16-ADF1-526C2BC53AE0}" type="datetimeFigureOut">
               <a:rPr lang="en-US" smtClean="0"/>
-              <a:t>20/05/2014</a:t>
+              <a:pPr/>
+              <a:t>5/20/2014</a:t>
             </a:fld>
             <a:endParaRPr lang="en-US"/>
           </a:p>
@@ -850,7 +857,8 @@
           <a:p>
             <a:fld id="{B416F5F1-DF15-4BE7-AEFB-601359FCFF9B}" type="slidenum">
               <a:rPr lang="en-US" smtClean="0"/>
-              <a:t>‹Nr.›</a:t>
+              <a:pPr/>
+              <a:t>‹#›</a:t>
             </a:fld>
             <a:endParaRPr lang="en-US"/>
           </a:p>
@@ -859,7 +867,7 @@
     </p:spTree>
     <p:extLst>
       <p:ext uri="{BB962C8B-B14F-4D97-AF65-F5344CB8AC3E}">
-        <p14:creationId xmlns:p14="http://schemas.microsoft.com/office/powerpoint/2010/main" val="234576983"/>
+        <p14:creationId xmlns:p14="http://schemas.microsoft.com/office/powerpoint/2010/main" xmlns="" val="234576983"/>
       </p:ext>
     </p:extLst>
   </p:cSld>
@@ -1054,7 +1062,8 @@
           <a:p>
             <a:fld id="{AB3B3CD4-9605-4B16-ADF1-526C2BC53AE0}" type="datetimeFigureOut">
               <a:rPr lang="en-US" smtClean="0"/>
-              <a:t>20/05/2014</a:t>
+              <a:pPr/>
+              <a:t>5/20/2014</a:t>
             </a:fld>
             <a:endParaRPr lang="en-US"/>
           </a:p>
@@ -1096,7 +1105,8 @@
           <a:p>
             <a:fld id="{B416F5F1-DF15-4BE7-AEFB-601359FCFF9B}" type="slidenum">
               <a:rPr lang="en-US" smtClean="0"/>
-              <a:t>‹Nr.›</a:t>
+              <a:pPr/>
+              <a:t>‹#›</a:t>
             </a:fld>
             <a:endParaRPr lang="en-US"/>
           </a:p>
@@ -1105,7 +1115,7 @@
     </p:spTree>
     <p:extLst>
       <p:ext uri="{BB962C8B-B14F-4D97-AF65-F5344CB8AC3E}">
-        <p14:creationId xmlns:p14="http://schemas.microsoft.com/office/powerpoint/2010/main" val="2455031330"/>
+        <p14:creationId xmlns:p14="http://schemas.microsoft.com/office/powerpoint/2010/main" xmlns="" val="2455031330"/>
       </p:ext>
     </p:extLst>
   </p:cSld>
@@ -1342,7 +1352,8 @@
           <a:p>
             <a:fld id="{AB3B3CD4-9605-4B16-ADF1-526C2BC53AE0}" type="datetimeFigureOut">
               <a:rPr lang="en-US" smtClean="0"/>
-              <a:t>20/05/2014</a:t>
+              <a:pPr/>
+              <a:t>5/20/2014</a:t>
             </a:fld>
             <a:endParaRPr lang="en-US"/>
           </a:p>
@@ -1384,7 +1395,8 @@
           <a:p>
             <a:fld id="{B416F5F1-DF15-4BE7-AEFB-601359FCFF9B}" type="slidenum">
               <a:rPr lang="en-US" smtClean="0"/>
-              <a:t>‹Nr.›</a:t>
+              <a:pPr/>
+              <a:t>‹#›</a:t>
             </a:fld>
             <a:endParaRPr lang="en-US"/>
           </a:p>
@@ -1393,7 +1405,7 @@
     </p:spTree>
     <p:extLst>
       <p:ext uri="{BB962C8B-B14F-4D97-AF65-F5344CB8AC3E}">
-        <p14:creationId xmlns:p14="http://schemas.microsoft.com/office/powerpoint/2010/main" val="3551008444"/>
+        <p14:creationId xmlns:p14="http://schemas.microsoft.com/office/powerpoint/2010/main" xmlns="" val="3551008444"/>
       </p:ext>
     </p:extLst>
   </p:cSld>
@@ -1769,7 +1781,8 @@
           <a:p>
             <a:fld id="{AB3B3CD4-9605-4B16-ADF1-526C2BC53AE0}" type="datetimeFigureOut">
               <a:rPr lang="en-US" smtClean="0"/>
-              <a:t>20/05/2014</a:t>
+              <a:pPr/>
+              <a:t>5/20/2014</a:t>
             </a:fld>
             <a:endParaRPr lang="en-US"/>
           </a:p>
@@ -1811,7 +1824,8 @@
           <a:p>
             <a:fld id="{B416F5F1-DF15-4BE7-AEFB-601359FCFF9B}" type="slidenum">
               <a:rPr lang="en-US" smtClean="0"/>
-              <a:t>‹Nr.›</a:t>
+              <a:pPr/>
+              <a:t>‹#›</a:t>
             </a:fld>
             <a:endParaRPr lang="en-US"/>
           </a:p>
@@ -1820,7 +1834,7 @@
     </p:spTree>
     <p:extLst>
       <p:ext uri="{BB962C8B-B14F-4D97-AF65-F5344CB8AC3E}">
-        <p14:creationId xmlns:p14="http://schemas.microsoft.com/office/powerpoint/2010/main" val="2621549410"/>
+        <p14:creationId xmlns:p14="http://schemas.microsoft.com/office/powerpoint/2010/main" xmlns="" val="2621549410"/>
       </p:ext>
     </p:extLst>
   </p:cSld>
@@ -1887,7 +1901,8 @@
           <a:p>
             <a:fld id="{AB3B3CD4-9605-4B16-ADF1-526C2BC53AE0}" type="datetimeFigureOut">
               <a:rPr lang="en-US" smtClean="0"/>
-              <a:t>20/05/2014</a:t>
+              <a:pPr/>
+              <a:t>5/20/2014</a:t>
             </a:fld>
             <a:endParaRPr lang="en-US"/>
           </a:p>
@@ -1929,7 +1944,8 @@
           <a:p>
             <a:fld id="{B416F5F1-DF15-4BE7-AEFB-601359FCFF9B}" type="slidenum">
               <a:rPr lang="en-US" smtClean="0"/>
-              <a:t>‹Nr.›</a:t>
+              <a:pPr/>
+              <a:t>‹#›</a:t>
             </a:fld>
             <a:endParaRPr lang="en-US"/>
           </a:p>
@@ -1938,7 +1954,7 @@
     </p:spTree>
     <p:extLst>
       <p:ext uri="{BB962C8B-B14F-4D97-AF65-F5344CB8AC3E}">
-        <p14:creationId xmlns:p14="http://schemas.microsoft.com/office/powerpoint/2010/main" val="2337226835"/>
+        <p14:creationId xmlns:p14="http://schemas.microsoft.com/office/powerpoint/2010/main" xmlns="" val="2337226835"/>
       </p:ext>
     </p:extLst>
   </p:cSld>
@@ -1982,7 +1998,8 @@
           <a:p>
             <a:fld id="{AB3B3CD4-9605-4B16-ADF1-526C2BC53AE0}" type="datetimeFigureOut">
               <a:rPr lang="en-US" smtClean="0"/>
-              <a:t>20/05/2014</a:t>
+              <a:pPr/>
+              <a:t>5/20/2014</a:t>
             </a:fld>
             <a:endParaRPr lang="en-US"/>
           </a:p>
@@ -2024,7 +2041,8 @@
           <a:p>
             <a:fld id="{B416F5F1-DF15-4BE7-AEFB-601359FCFF9B}" type="slidenum">
               <a:rPr lang="en-US" smtClean="0"/>
-              <a:t>‹Nr.›</a:t>
+              <a:pPr/>
+              <a:t>‹#›</a:t>
             </a:fld>
             <a:endParaRPr lang="en-US"/>
           </a:p>
@@ -2033,7 +2051,7 @@
     </p:spTree>
     <p:extLst>
       <p:ext uri="{BB962C8B-B14F-4D97-AF65-F5344CB8AC3E}">
-        <p14:creationId xmlns:p14="http://schemas.microsoft.com/office/powerpoint/2010/main" val="3450073293"/>
+        <p14:creationId xmlns:p14="http://schemas.microsoft.com/office/powerpoint/2010/main" xmlns="" val="3450073293"/>
       </p:ext>
     </p:extLst>
   </p:cSld>
@@ -2259,7 +2277,8 @@
           <a:p>
             <a:fld id="{AB3B3CD4-9605-4B16-ADF1-526C2BC53AE0}" type="datetimeFigureOut">
               <a:rPr lang="en-US" smtClean="0"/>
-              <a:t>20/05/2014</a:t>
+              <a:pPr/>
+              <a:t>5/20/2014</a:t>
             </a:fld>
             <a:endParaRPr lang="en-US"/>
           </a:p>
@@ -2301,7 +2320,8 @@
           <a:p>
             <a:fld id="{B416F5F1-DF15-4BE7-AEFB-601359FCFF9B}" type="slidenum">
               <a:rPr lang="en-US" smtClean="0"/>
-              <a:t>‹Nr.›</a:t>
+              <a:pPr/>
+              <a:t>‹#›</a:t>
             </a:fld>
             <a:endParaRPr lang="en-US"/>
           </a:p>
@@ -2310,7 +2330,7 @@
     </p:spTree>
     <p:extLst>
       <p:ext uri="{BB962C8B-B14F-4D97-AF65-F5344CB8AC3E}">
-        <p14:creationId xmlns:p14="http://schemas.microsoft.com/office/powerpoint/2010/main" val="2517025264"/>
+        <p14:creationId xmlns:p14="http://schemas.microsoft.com/office/powerpoint/2010/main" xmlns="" val="2517025264"/>
       </p:ext>
     </p:extLst>
   </p:cSld>
@@ -2512,7 +2532,8 @@
           <a:p>
             <a:fld id="{AB3B3CD4-9605-4B16-ADF1-526C2BC53AE0}" type="datetimeFigureOut">
               <a:rPr lang="en-US" smtClean="0"/>
-              <a:t>20/05/2014</a:t>
+              <a:pPr/>
+              <a:t>5/20/2014</a:t>
             </a:fld>
             <a:endParaRPr lang="en-US"/>
           </a:p>
@@ -2554,7 +2575,8 @@
           <a:p>
             <a:fld id="{B416F5F1-DF15-4BE7-AEFB-601359FCFF9B}" type="slidenum">
               <a:rPr lang="en-US" smtClean="0"/>
-              <a:t>‹Nr.›</a:t>
+              <a:pPr/>
+              <a:t>‹#›</a:t>
             </a:fld>
             <a:endParaRPr lang="en-US"/>
           </a:p>
@@ -2563,7 +2585,7 @@
     </p:spTree>
     <p:extLst>
       <p:ext uri="{BB962C8B-B14F-4D97-AF65-F5344CB8AC3E}">
-        <p14:creationId xmlns:p14="http://schemas.microsoft.com/office/powerpoint/2010/main" val="3855469034"/>
+        <p14:creationId xmlns:p14="http://schemas.microsoft.com/office/powerpoint/2010/main" xmlns="" val="3855469034"/>
       </p:ext>
     </p:extLst>
   </p:cSld>
@@ -2725,7 +2747,8 @@
           <a:p>
             <a:fld id="{AB3B3CD4-9605-4B16-ADF1-526C2BC53AE0}" type="datetimeFigureOut">
               <a:rPr lang="en-US" smtClean="0"/>
-              <a:t>20/05/2014</a:t>
+              <a:pPr/>
+              <a:t>5/20/2014</a:t>
             </a:fld>
             <a:endParaRPr lang="en-US"/>
           </a:p>
@@ -2803,7 +2826,8 @@
           <a:p>
             <a:fld id="{B416F5F1-DF15-4BE7-AEFB-601359FCFF9B}" type="slidenum">
               <a:rPr lang="en-US" smtClean="0"/>
-              <a:t>‹Nr.›</a:t>
+              <a:pPr/>
+              <a:t>‹#›</a:t>
             </a:fld>
             <a:endParaRPr lang="en-US"/>
           </a:p>
@@ -2812,7 +2836,7 @@
     </p:spTree>
     <p:extLst>
       <p:ext uri="{BB962C8B-B14F-4D97-AF65-F5344CB8AC3E}">
-        <p14:creationId xmlns:p14="http://schemas.microsoft.com/office/powerpoint/2010/main" val="1581356310"/>
+        <p14:creationId xmlns:p14="http://schemas.microsoft.com/office/powerpoint/2010/main" xmlns="" val="1581356310"/>
       </p:ext>
     </p:extLst>
   </p:cSld>
@@ -3109,7 +3133,7 @@
         <p:spPr>
           <a:xfrm>
             <a:off x="15337971" y="4452878"/>
-            <a:ext cx="13116379" cy="2862322"/>
+            <a:ext cx="13116379" cy="2308324"/>
           </a:xfrm>
           <a:prstGeom prst="rect">
             <a:avLst/>
@@ -3129,36 +3153,29 @@
             <a:pPr algn="ctr"/>
             <a:r>
               <a:rPr lang="en-US" sz="3600" dirty="0" smtClean="0"/>
-              <a:t> </a:t>
+              <a:t>‡</a:t>
+            </a:r>
+            <a:r>
+              <a:rPr lang="en-US" sz="3600" dirty="0" smtClean="0"/>
+              <a:t>EURECOM </a:t>
             </a:r>
           </a:p>
           <a:p>
             <a:pPr algn="ctr"/>
             <a:r>
+              <a:rPr lang="fr-FR" sz="3600" dirty="0" smtClean="0"/>
+              <a:t>Sophia </a:t>
+            </a:r>
+            <a:r>
+              <a:rPr lang="fr-FR" sz="3600" dirty="0" smtClean="0"/>
+              <a:t>Antipolis, France </a:t>
+            </a:r>
+          </a:p>
+          <a:p>
+            <a:pPr algn="ctr"/>
+            <a:r>
               <a:rPr lang="en-US" sz="3600" dirty="0" smtClean="0"/>
-              <a:t>‡EURECOM </a:t>
-            </a:r>
-          </a:p>
-          <a:p>
-            <a:pPr algn="ctr"/>
-            <a:r>
-              <a:rPr lang="fr-FR" sz="3600" dirty="0" smtClean="0"/>
-              <a:t>2229 route des </a:t>
-            </a:r>
-            <a:r>
-              <a:rPr lang="fr-FR" sz="3600" dirty="0" err="1" smtClean="0"/>
-              <a:t>crètes</a:t>
-            </a:r>
-            <a:r>
-              <a:rPr lang="fr-FR" sz="3600" dirty="0" smtClean="0"/>
-              <a:t>, 06560 Sophia Antipolis, France </a:t>
-            </a:r>
-          </a:p>
-          <a:p>
-            <a:pPr algn="ctr"/>
-            <a:r>
-              <a:rPr lang="en-US" sz="3600" dirty="0" smtClean="0"/>
-              <a:t>Firstname.lastname@eurecom.fr </a:t>
+              <a:t>firstname.lastname@eurecom.fr </a:t>
             </a:r>
             <a:endParaRPr lang="en-US" sz="3600" dirty="0"/>
           </a:p>
@@ -3173,10 +3190,10 @@
           <p:nvPr/>
         </p:nvPicPr>
         <p:blipFill>
-          <a:blip r:embed="rId2">
+          <a:blip r:embed="rId2" cstate="print">
             <a:extLst>
               <a:ext uri="{28A0092B-C50C-407E-A947-70E740481C1C}">
-                <a14:useLocalDpi xmlns:a14="http://schemas.microsoft.com/office/drawing/2010/main" val="0"/>
+                <a14:useLocalDpi xmlns:a14="http://schemas.microsoft.com/office/drawing/2010/main" xmlns="" val="0"/>
               </a:ext>
             </a:extLst>
           </a:blip>
@@ -3383,7 +3400,7 @@
         <p:spPr>
           <a:xfrm>
             <a:off x="1022350" y="5047833"/>
-            <a:ext cx="13116379" cy="2800767"/>
+            <a:ext cx="13116379" cy="2185214"/>
           </a:xfrm>
           <a:prstGeom prst="rect">
             <a:avLst/>
@@ -3398,27 +3415,36 @@
           <a:p>
             <a:pPr algn="ctr"/>
             <a:r>
-              <a:rPr lang="en-US" sz="3600" smtClean="0"/>
+              <a:rPr lang="en-US" sz="3600" dirty="0" smtClean="0"/>
               <a:t>†SAP Research, SAP Labs France SAS </a:t>
             </a:r>
           </a:p>
           <a:p>
             <a:pPr algn="ctr"/>
             <a:r>
-              <a:rPr lang="fr-FR" sz="3600" smtClean="0"/>
-              <a:t>805 avenue du Dr. Maurice Donat, BP 1216, 06254 Mougins Cedex, France </a:t>
+              <a:rPr lang="fr-FR" sz="3600" dirty="0" smtClean="0"/>
+              <a:t>Mougins, </a:t>
+            </a:r>
+            <a:r>
+              <a:rPr lang="fr-FR" sz="3600" dirty="0" smtClean="0"/>
+              <a:t>France </a:t>
             </a:r>
           </a:p>
           <a:p>
             <a:pPr algn="ctr"/>
             <a:r>
-              <a:rPr lang="en-US" sz="3600" smtClean="0"/>
-              <a:t>Ahmad.assaf@sap.com </a:t>
-            </a:r>
+              <a:rPr lang="en-US" sz="3600" dirty="0" smtClean="0"/>
+              <a:t>a</a:t>
+            </a:r>
+            <a:r>
+              <a:rPr lang="en-US" sz="3600" dirty="0" smtClean="0"/>
+              <a:t>hmad.assaf@sap.com </a:t>
+            </a:r>
+            <a:endParaRPr lang="en-US" sz="3600" dirty="0" smtClean="0"/>
           </a:p>
           <a:p>
             <a:pPr algn="ctr"/>
-            <a:endParaRPr lang="en-US" sz="2800"/>
+            <a:endParaRPr lang="en-US" sz="2800" dirty="0"/>
           </a:p>
         </p:txBody>
       </p:sp>
@@ -3446,18 +3472,34 @@
           <a:p>
             <a:pPr algn="ctr"/>
             <a:r>
-              <a:rPr lang="en-US" sz="6000">
+              <a:rPr lang="en-US" sz="6000" dirty="0">
                 <a:solidFill>
                   <a:srgbClr val="3799F3"/>
                 </a:solidFill>
               </a:rPr>
-              <a:t>Entities are generally described with</a:t>
+              <a:t>Entities are generally </a:t>
+            </a:r>
+            <a:r>
+              <a:rPr lang="en-US" sz="6000" dirty="0" smtClean="0">
+                <a:solidFill>
+                  <a:srgbClr val="3799F3"/>
+                </a:solidFill>
+              </a:rPr>
+              <a:t>described in knowledge bases </a:t>
+            </a:r>
+            <a:r>
+              <a:rPr lang="en-US" sz="6000" dirty="0">
+                <a:solidFill>
+                  <a:srgbClr val="3799F3"/>
+                </a:solidFill>
+              </a:rPr>
+              <a:t>with</a:t>
             </a:r>
           </a:p>
           <a:p>
             <a:pPr algn="ctr"/>
             <a:r>
-              <a:rPr lang="en-US" sz="6000">
+              <a:rPr lang="en-US" sz="6000" dirty="0">
                 <a:solidFill>
                   <a:srgbClr val="3799F3"/>
                 </a:solidFill>
@@ -3465,7 +3507,7 @@
               <a:t>a lot of properties, this is the case for </a:t>
             </a:r>
             <a:r>
-              <a:rPr lang="en-US" sz="6000" err="1">
+              <a:rPr lang="en-US" sz="6000" dirty="0" err="1">
                 <a:solidFill>
                   <a:srgbClr val="3799F3"/>
                 </a:solidFill>
@@ -3473,7 +3515,7 @@
               <a:t>DBpedia</a:t>
             </a:r>
             <a:r>
-              <a:rPr lang="en-US" sz="6000">
+              <a:rPr lang="en-US" sz="6000" dirty="0">
                 <a:solidFill>
                   <a:srgbClr val="3799F3"/>
                 </a:solidFill>
@@ -3481,14 +3523,14 @@
               <a:t>. It is, however, </a:t>
             </a:r>
             <a:r>
-              <a:rPr lang="en-US" sz="6000" smtClean="0">
+              <a:rPr lang="en-US" sz="6000" dirty="0" smtClean="0">
                 <a:solidFill>
                   <a:srgbClr val="3799F3"/>
                 </a:solidFill>
               </a:rPr>
               <a:t>difficult</a:t>
             </a:r>
-            <a:endParaRPr lang="en-US" sz="6000">
+            <a:endParaRPr lang="en-US" sz="6000" dirty="0">
               <a:solidFill>
                 <a:srgbClr val="3799F3"/>
               </a:solidFill>
@@ -3497,7 +3539,7 @@
           <a:p>
             <a:pPr algn="ctr"/>
             <a:r>
-              <a:rPr lang="en-US" sz="6000">
+              <a:rPr lang="en-US" sz="6000" dirty="0">
                 <a:solidFill>
                   <a:srgbClr val="3799F3"/>
                 </a:solidFill>
@@ -3505,7 +3547,7 @@
               <a:t>to assess which ones are more </a:t>
             </a:r>
             <a:r>
-              <a:rPr lang="en-US" sz="6000" smtClean="0">
+              <a:rPr lang="en-US" sz="6000" dirty="0" smtClean="0">
                 <a:solidFill>
                   <a:srgbClr val="3799F3"/>
                 </a:solidFill>
@@ -3513,7 +3555,7 @@
               <a:t>“important” </a:t>
             </a:r>
             <a:r>
-              <a:rPr lang="en-US" sz="6000">
+              <a:rPr lang="en-US" sz="6000" dirty="0">
                 <a:solidFill>
                   <a:srgbClr val="3799F3"/>
                 </a:solidFill>
@@ -3653,10 +3695,10 @@
           <p:nvPr/>
         </p:nvPicPr>
         <p:blipFill>
-          <a:blip r:embed="rId3">
+          <a:blip r:embed="rId3" cstate="print">
             <a:extLst>
               <a:ext uri="{28A0092B-C50C-407E-A947-70E740481C1C}">
-                <a14:useLocalDpi xmlns:a14="http://schemas.microsoft.com/office/drawing/2010/main" val="0"/>
+                <a14:useLocalDpi xmlns:a14="http://schemas.microsoft.com/office/drawing/2010/main" xmlns="" val="0"/>
               </a:ext>
             </a:extLst>
           </a:blip>
@@ -3676,7 +3718,7 @@
           <a:noFill/>
           <a:extLst>
             <a:ext uri="{909E8E84-426E-40dd-AFC4-6F175D3DCCD1}">
-              <a14:hiddenFill xmlns:a14="http://schemas.microsoft.com/office/drawing/2010/main">
+              <a14:hiddenFill xmlns:a14="http://schemas.microsoft.com/office/drawing/2010/main" xmlns="">
                 <a:solidFill>
                   <a:srgbClr val="FFFFFF"/>
                 </a:solidFill>
@@ -3793,7 +3835,7 @@
         <p:spPr>
           <a:xfrm>
             <a:off x="2012950" y="12378779"/>
-            <a:ext cx="12192001" cy="769441"/>
+            <a:ext cx="27432000" cy="1446550"/>
           </a:xfrm>
           <a:prstGeom prst="rect">
             <a:avLst/>
@@ -3807,18 +3849,43 @@
           <a:lstStyle/>
           <a:p>
             <a:r>
-              <a:rPr lang="en-US" sz="4400" smtClean="0"/>
+              <a:rPr lang="en-US" sz="4400" dirty="0" smtClean="0"/>
               <a:t>Question </a:t>
             </a:r>
             <a:r>
-              <a:rPr lang="en-US" sz="4400"/>
-              <a:t>answering system such as </a:t>
-            </a:r>
-            <a:r>
-              <a:rPr lang="en-US" sz="4400" err="1" smtClean="0"/>
+              <a:rPr lang="en-US" sz="4400" dirty="0"/>
+              <a:t>A</a:t>
+            </a:r>
+            <a:r>
+              <a:rPr lang="en-US" sz="4400" dirty="0" smtClean="0"/>
+              <a:t>nswering </a:t>
+            </a:r>
+            <a:r>
+              <a:rPr lang="en-US" sz="4400" dirty="0"/>
+              <a:t>system such as </a:t>
+            </a:r>
+            <a:r>
+              <a:rPr lang="en-US" sz="4400" dirty="0" err="1" smtClean="0"/>
               <a:t>QakisMedia</a:t>
             </a:r>
-            <a:endParaRPr lang="fr-FR" sz="4400"/>
+            <a:r>
+              <a:rPr lang="en-US" sz="4400" dirty="0" smtClean="0"/>
+              <a:t>:</a:t>
+            </a:r>
+            <a:r>
+              <a:rPr lang="en-US" sz="4400" dirty="0" smtClean="0"/>
+              <a:t> </a:t>
+            </a:r>
+            <a:r>
+              <a:rPr lang="fr-FR" sz="4400" dirty="0" smtClean="0">
+                <a:hlinkClick r:id="rId4"/>
+              </a:rPr>
+              <a:t>http://qakis.org/</a:t>
+            </a:r>
+            <a:endParaRPr lang="fr-FR" sz="4400" dirty="0" smtClean="0"/>
+          </a:p>
+          <a:p>
+            <a:endParaRPr lang="fr-FR" sz="4400" dirty="0"/>
           </a:p>
         </p:txBody>
       </p:sp>
@@ -4029,7 +4096,7 @@
         <p:spPr>
           <a:xfrm>
             <a:off x="2012949" y="13563600"/>
-            <a:ext cx="19735801" cy="769441"/>
+            <a:ext cx="27355801" cy="769441"/>
           </a:xfrm>
           <a:prstGeom prst="rect">
             <a:avLst/>
@@ -4059,8 +4126,20 @@
               <a:t>application </a:t>
             </a:r>
             <a:r>
-              <a:rPr lang="en-US" sz="4400" dirty="0"/>
-              <a:t>providing more information about a particular TV program</a:t>
+              <a:rPr lang="en-US" sz="4400" dirty="0" smtClean="0"/>
+              <a:t>for a TV program: </a:t>
+            </a:r>
+            <a:r>
+              <a:rPr lang="fr-FR" sz="4400" dirty="0" smtClean="0">
+                <a:hlinkClick r:id="rId5"/>
+              </a:rPr>
+              <a:t>http</a:t>
+            </a:r>
+            <a:r>
+              <a:rPr lang="fr-FR" sz="4400" dirty="0" smtClean="0">
+                <a:hlinkClick r:id="rId5"/>
+              </a:rPr>
+              <a:t>://www.linkedtv.eu/demos/linkednews/</a:t>
             </a:r>
             <a:endParaRPr lang="fr-FR" sz="4400" dirty="0"/>
           </a:p>
@@ -4093,130 +4172,6 @@
               <a:t>Data augmentation in business intelligence applications</a:t>
             </a:r>
             <a:endParaRPr lang="fr-FR" sz="4400"/>
-          </a:p>
-        </p:txBody>
-      </p:sp>
-      <p:sp>
-        <p:nvSpPr>
-          <p:cNvPr id="23" name="TextBox 22"/>
-          <p:cNvSpPr txBox="1"/>
-          <p:nvPr/>
-        </p:nvSpPr>
-        <p:spPr>
-          <a:xfrm>
-            <a:off x="12871450" y="12274401"/>
-            <a:ext cx="457200" cy="461665"/>
-          </a:xfrm>
-          <a:prstGeom prst="rect">
-            <a:avLst/>
-          </a:prstGeom>
-          <a:noFill/>
-        </p:spPr>
-        <p:txBody>
-          <a:bodyPr wrap="square" rtlCol="0">
-            <a:spAutoFit/>
-          </a:bodyPr>
-          <a:lstStyle/>
-          <a:p>
-            <a:r>
-              <a:rPr lang="en-US" sz="2400" smtClean="0"/>
-              <a:t>1</a:t>
-            </a:r>
-            <a:endParaRPr lang="fr-FR" sz="2400"/>
-          </a:p>
-        </p:txBody>
-      </p:sp>
-      <p:sp>
-        <p:nvSpPr>
-          <p:cNvPr id="70" name="TextBox 69"/>
-          <p:cNvSpPr txBox="1"/>
-          <p:nvPr/>
-        </p:nvSpPr>
-        <p:spPr>
-          <a:xfrm>
-            <a:off x="21291550" y="13467195"/>
-            <a:ext cx="457200" cy="461665"/>
-          </a:xfrm>
-          <a:prstGeom prst="rect">
-            <a:avLst/>
-          </a:prstGeom>
-          <a:noFill/>
-        </p:spPr>
-        <p:txBody>
-          <a:bodyPr wrap="square" rtlCol="0">
-            <a:spAutoFit/>
-          </a:bodyPr>
-          <a:lstStyle/>
-          <a:p>
-            <a:r>
-              <a:rPr lang="en-US" sz="2400" smtClean="0"/>
-              <a:t>2</a:t>
-            </a:r>
-            <a:endParaRPr lang="fr-FR" sz="2400"/>
-          </a:p>
-        </p:txBody>
-      </p:sp>
-      <p:sp>
-        <p:nvSpPr>
-          <p:cNvPr id="71" name="TextBox 70"/>
-          <p:cNvSpPr txBox="1"/>
-          <p:nvPr/>
-        </p:nvSpPr>
-        <p:spPr>
-          <a:xfrm>
-            <a:off x="336550" y="42192714"/>
-            <a:ext cx="12192001" cy="1015663"/>
-          </a:xfrm>
-          <a:prstGeom prst="rect">
-            <a:avLst/>
-          </a:prstGeom>
-          <a:noFill/>
-        </p:spPr>
-        <p:txBody>
-          <a:bodyPr wrap="square" rtlCol="0">
-            <a:spAutoFit/>
-          </a:bodyPr>
-          <a:lstStyle/>
-          <a:p>
-            <a:pPr marL="742950" indent="-742950">
-              <a:buFont typeface="+mj-lt"/>
-              <a:buAutoNum type="arabicPeriod"/>
-            </a:pPr>
-            <a:r>
-              <a:rPr lang="fr-FR" sz="2000">
-                <a:hlinkClick r:id="rId4"/>
-              </a:rPr>
-              <a:t>http://qakis.org</a:t>
-            </a:r>
-            <a:r>
-              <a:rPr lang="fr-FR" sz="2000" smtClean="0">
-                <a:hlinkClick r:id="rId4"/>
-              </a:rPr>
-              <a:t>/</a:t>
-            </a:r>
-            <a:endParaRPr lang="fr-FR" sz="2000" smtClean="0"/>
-          </a:p>
-          <a:p>
-            <a:pPr marL="742950" indent="-742950">
-              <a:buFont typeface="+mj-lt"/>
-              <a:buAutoNum type="arabicPeriod"/>
-            </a:pPr>
-            <a:r>
-              <a:rPr lang="fr-FR" sz="2000">
-                <a:hlinkClick r:id="rId5"/>
-              </a:rPr>
-              <a:t>http://www.linkedtv.eu/demos/linkednews</a:t>
-            </a:r>
-            <a:r>
-              <a:rPr lang="fr-FR" sz="2000" smtClean="0">
-                <a:hlinkClick r:id="rId5"/>
-              </a:rPr>
-              <a:t>/</a:t>
-            </a:r>
-            <a:endParaRPr lang="fr-FR" sz="2000" smtClean="0"/>
-          </a:p>
-          <a:p>
-            <a:endParaRPr lang="fr-FR" sz="2000"/>
           </a:p>
         </p:txBody>
       </p:sp>
@@ -4345,7 +4300,7 @@
                   </a:schemeClr>
                 </a:solidFill>
               </a:rPr>
-              <a:t>in our experiment that the properties displayed for </a:t>
+              <a:t>in our </a:t>
             </a:r>
             <a:r>
               <a:rPr lang="en-US" sz="4000" dirty="0" smtClean="0">
@@ -4356,7 +4311,7 @@
                   </a:schemeClr>
                 </a:solidFill>
               </a:rPr>
-              <a:t>an entity </a:t>
+              <a:t>experiments </a:t>
             </a:r>
             <a:r>
               <a:rPr lang="en-US" sz="4000" dirty="0">
@@ -4367,7 +4322,7 @@
                   </a:schemeClr>
                 </a:solidFill>
               </a:rPr>
-              <a:t>are </a:t>
+              <a:t>that the properties displayed for </a:t>
             </a:r>
             <a:r>
               <a:rPr lang="en-US" sz="4000" dirty="0" smtClean="0">
@@ -4378,7 +4333,7 @@
                   </a:schemeClr>
                 </a:solidFill>
               </a:rPr>
-              <a:t>“entity type dependent” </a:t>
+              <a:t>an entity </a:t>
             </a:r>
             <a:r>
               <a:rPr lang="en-US" sz="4000" dirty="0">
@@ -4389,7 +4344,7 @@
                   </a:schemeClr>
                 </a:solidFill>
               </a:rPr>
-              <a:t>and that context (</a:t>
+              <a:t>are </a:t>
             </a:r>
             <a:r>
               <a:rPr lang="en-US" sz="4000" dirty="0" smtClean="0">
@@ -4400,10 +4355,10 @@
                   </a:schemeClr>
                 </a:solidFill>
               </a:rPr>
-              <a:t>country, query</a:t>
-            </a:r>
-            <a:r>
-              <a:rPr lang="en-US" sz="4000" dirty="0">
+              <a:t>type and context-dependent (</a:t>
+            </a:r>
+            <a:r>
+              <a:rPr lang="en-US" sz="4000" dirty="0" smtClean="0">
                 <a:solidFill>
                   <a:schemeClr val="tx1">
                     <a:lumMod val="50000"/>
@@ -4411,10 +4366,10 @@
                   </a:schemeClr>
                 </a:solidFill>
               </a:rPr>
-              <a:t>, time, </a:t>
-            </a:r>
-            <a:r>
-              <a:rPr lang="en-US" sz="4000" dirty="0" err="1">
+              <a:t>country, query</a:t>
+            </a:r>
+            <a:r>
+              <a:rPr lang="en-US" sz="4000" dirty="0">
                 <a:solidFill>
                   <a:schemeClr val="tx1">
                     <a:lumMod val="50000"/>
@@ -4422,10 +4377,10 @@
                   </a:schemeClr>
                 </a:solidFill>
               </a:rPr>
-              <a:t>etc</a:t>
-            </a:r>
-            <a:r>
-              <a:rPr lang="en-US" sz="4000" dirty="0">
+              <a:t>, time, </a:t>
+            </a:r>
+            <a:r>
+              <a:rPr lang="en-US" sz="4000" dirty="0" smtClean="0">
                 <a:solidFill>
                   <a:schemeClr val="tx1">
                     <a:lumMod val="50000"/>
@@ -4433,18 +4388,7 @@
                   </a:schemeClr>
                 </a:solidFill>
               </a:rPr>
-              <a:t>) can </a:t>
-            </a:r>
-            <a:r>
-              <a:rPr lang="en-US" sz="4000" dirty="0" smtClean="0">
-                <a:solidFill>
-                  <a:schemeClr val="tx1">
-                    <a:lumMod val="50000"/>
-                    <a:lumOff val="50000"/>
-                  </a:schemeClr>
-                </a:solidFill>
-              </a:rPr>
-              <a:t>affect </a:t>
+              <a:t>etc.) which affect </a:t>
             </a:r>
             <a:r>
               <a:rPr lang="en-US" sz="4000" dirty="0">
@@ -4673,7 +4617,11 @@
             </a:r>
             <a:r>
               <a:rPr lang="en-US" sz="4000" dirty="0"/>
-              <a:t>by setting the User </a:t>
+              <a:t>by setting </a:t>
+            </a:r>
+            <a:r>
+              <a:rPr lang="en-US" sz="4000" dirty="0" smtClean="0"/>
+              <a:t>a browser User </a:t>
             </a:r>
             <a:r>
               <a:rPr lang="en-US" sz="4000" dirty="0" smtClean="0"/>
@@ -4757,15 +4705,11 @@
             </a:pPr>
             <a:r>
               <a:rPr lang="en-US" sz="4000" dirty="0" smtClean="0"/>
-              <a:t>If we do not find a GKP in a SERP </a:t>
-            </a:r>
-            <a:r>
-              <a:rPr lang="en-US" sz="4000" dirty="0"/>
-              <a:t>this </a:t>
+              <a:t>If we do not find a GKP in a </a:t>
             </a:r>
             <a:r>
               <a:rPr lang="en-US" sz="4000" dirty="0" smtClean="0"/>
-              <a:t>we </a:t>
+              <a:t>SERP, we </a:t>
             </a:r>
             <a:r>
               <a:rPr lang="en-US" sz="4000" dirty="0"/>
@@ -4824,10 +4768,10 @@
           <p:nvPr/>
         </p:nvPicPr>
         <p:blipFill>
-          <a:blip r:embed="rId6">
+          <a:blip r:embed="rId6" cstate="print">
             <a:extLst>
               <a:ext uri="{28A0092B-C50C-407E-A947-70E740481C1C}">
-                <a14:useLocalDpi xmlns:a14="http://schemas.microsoft.com/office/drawing/2010/main" val="0"/>
+                <a14:useLocalDpi xmlns:a14="http://schemas.microsoft.com/office/drawing/2010/main" xmlns="" val="0"/>
               </a:ext>
             </a:extLst>
           </a:blip>
@@ -4851,14 +4795,14 @@
           <a:effectLst/>
           <a:extLst>
             <a:ext uri="{909E8E84-426E-40dd-AFC4-6F175D3DCCD1}">
-              <a14:hiddenFill xmlns:a14="http://schemas.microsoft.com/office/drawing/2010/main">
+              <a14:hiddenFill xmlns:a14="http://schemas.microsoft.com/office/drawing/2010/main" xmlns="">
                 <a:solidFill>
                   <a:schemeClr val="accent1"/>
                 </a:solidFill>
               </a14:hiddenFill>
             </a:ext>
             <a:ext uri="{91240B29-F687-4f45-9708-019B960494DF}">
-              <a14:hiddenLine xmlns:a14="http://schemas.microsoft.com/office/drawing/2010/main" w="9525">
+              <a14:hiddenLine xmlns:a14="http://schemas.microsoft.com/office/drawing/2010/main" xmlns="" w="9525">
                 <a:solidFill>
                   <a:schemeClr val="tx1"/>
                 </a:solidFill>
@@ -4868,7 +4812,7 @@
               </a14:hiddenLine>
             </a:ext>
             <a:ext uri="{AF507438-7753-43e0-B8FC-AC1667EBCBE1}">
-              <a14:hiddenEffects xmlns:a14="http://schemas.microsoft.com/office/drawing/2010/main">
+              <a14:hiddenEffects xmlns:a14="http://schemas.microsoft.com/office/drawing/2010/main" xmlns="">
                 <a:effectLst>
                   <a:outerShdw dist="35921" dir="2700000" algn="ctr" rotWithShape="0">
                     <a:schemeClr val="bg2"/>
@@ -5439,7 +5383,23 @@
                   <a:srgbClr val="3799F3"/>
                 </a:solidFill>
               </a:rPr>
-              <a:t>We aggregate the properties captured for all the instances of a certain concept </a:t>
+              <a:t>We aggregate the properties captured for all the instances of </a:t>
+            </a:r>
+            <a:r>
+              <a:rPr lang="en-US" sz="4000" dirty="0" smtClean="0">
+                <a:solidFill>
+                  <a:srgbClr val="3799F3"/>
+                </a:solidFill>
+              </a:rPr>
+              <a:t>each </a:t>
+            </a:r>
+            <a:r>
+              <a:rPr lang="en-US" sz="4000" dirty="0">
+                <a:solidFill>
+                  <a:srgbClr val="3799F3"/>
+                </a:solidFill>
+              </a:rPr>
+              <a:t>concept </a:t>
             </a:r>
             <a:r>
               <a:rPr lang="en-US" sz="4000" dirty="0" smtClean="0">
@@ -5499,10 +5459,10 @@
           <p:nvPr/>
         </p:nvPicPr>
         <p:blipFill>
-          <a:blip r:embed="rId7">
+          <a:blip r:embed="rId7" cstate="print">
             <a:extLst>
               <a:ext uri="{28A0092B-C50C-407E-A947-70E740481C1C}">
-                <a14:useLocalDpi xmlns:a14="http://schemas.microsoft.com/office/drawing/2010/main" val="0"/>
+                <a14:useLocalDpi xmlns:a14="http://schemas.microsoft.com/office/drawing/2010/main" xmlns="" val="0"/>
               </a:ext>
             </a:extLst>
           </a:blip>
@@ -5522,7 +5482,7 @@
           <a:noFill/>
           <a:extLst>
             <a:ext uri="{909E8E84-426E-40dd-AFC4-6F175D3DCCD1}">
-              <a14:hiddenFill xmlns:a14="http://schemas.microsoft.com/office/drawing/2010/main">
+              <a14:hiddenFill xmlns:a14="http://schemas.microsoft.com/office/drawing/2010/main" xmlns="">
                 <a:solidFill>
                   <a:srgbClr val="FFFFFF"/>
                 </a:solidFill>
@@ -5821,8 +5781,8 @@
         </p:nvSpPr>
         <p:spPr>
           <a:xfrm>
-            <a:off x="602569" y="33426321"/>
-            <a:ext cx="13955940" cy="6247864"/>
+            <a:off x="793750" y="33451800"/>
+            <a:ext cx="14288181" cy="6247864"/>
           </a:xfrm>
           <a:prstGeom prst="rect">
             <a:avLst/>
@@ -5844,12 +5804,12 @@
               <a:t>We </a:t>
             </a:r>
             <a:r>
-              <a:rPr lang="en-US" sz="4000" dirty="0"/>
-              <a:t>can now </a:t>
-            </a:r>
-            <a:r>
               <a:rPr lang="en-US" sz="4000" dirty="0" smtClean="0"/>
-              <a:t>empirically define </a:t>
+              <a:t>empirically </a:t>
+            </a:r>
+            <a:r>
+              <a:rPr lang="en-US" sz="4000" dirty="0" smtClean="0"/>
+              <a:t>define </a:t>
             </a:r>
             <a:r>
               <a:rPr lang="en-US" sz="4000" dirty="0"/>
@@ -5897,16 +5857,12 @@
               <a:t>Google Knowledge Graph panel varies across </a:t>
             </a:r>
             <a:r>
-              <a:rPr lang="en-US" sz="4000" dirty="0" err="1"/>
-              <a:t>geolocation</a:t>
-            </a:r>
-            <a:r>
-              <a:rPr lang="en-US" sz="4000" dirty="0"/>
-              <a:t> </a:t>
-            </a:r>
-            <a:r>
               <a:rPr lang="en-US" sz="4000" dirty="0" smtClean="0"/>
-              <a:t>and time</a:t>
+              <a:t>top level countries and </a:t>
+            </a:r>
+            <a:r>
+              <a:rPr lang="en-US" sz="4000" dirty="0" smtClean="0"/>
+              <a:t>time</a:t>
             </a:r>
           </a:p>
           <a:p>
@@ -5972,7 +5928,7 @@
     </p:spTree>
     <p:extLst>
       <p:ext uri="{BB962C8B-B14F-4D97-AF65-F5344CB8AC3E}">
-        <p14:creationId xmlns:p14="http://schemas.microsoft.com/office/powerpoint/2010/main" val="1783528801"/>
+        <p14:creationId xmlns:p14="http://schemas.microsoft.com/office/powerpoint/2010/main" xmlns="" val="1783528801"/>
       </p:ext>
     </p:extLst>
   </p:cSld>

</xml_diff>

<commit_message>
Modifying the latest version from Ahmad
</commit_message>
<xml_diff>
--- a/poster/eswc2014-poster.pptx
+++ b/poster/eswc2014-poster.pptx
@@ -3153,22 +3153,14 @@
             <a:pPr algn="ctr"/>
             <a:r>
               <a:rPr lang="en-US" sz="3600" dirty="0" smtClean="0"/>
-              <a:t>‡</a:t>
-            </a:r>
-            <a:r>
-              <a:rPr lang="en-US" sz="3600" dirty="0" smtClean="0"/>
-              <a:t>EURECOM </a:t>
+              <a:t>‡EURECOM </a:t>
             </a:r>
           </a:p>
           <a:p>
             <a:pPr algn="ctr"/>
             <a:r>
               <a:rPr lang="fr-FR" sz="3600" dirty="0" smtClean="0"/>
-              <a:t>Sophia </a:t>
-            </a:r>
-            <a:r>
-              <a:rPr lang="fr-FR" sz="3600" dirty="0" smtClean="0"/>
-              <a:t>Antipolis, France </a:t>
+              <a:t>Sophia Antipolis, France </a:t>
             </a:r>
           </a:p>
           <a:p>
@@ -3423,24 +3415,15 @@
             <a:pPr algn="ctr"/>
             <a:r>
               <a:rPr lang="fr-FR" sz="3600" dirty="0" smtClean="0"/>
-              <a:t>Mougins, </a:t>
-            </a:r>
-            <a:r>
-              <a:rPr lang="fr-FR" sz="3600" dirty="0" smtClean="0"/>
-              <a:t>France </a:t>
+              <a:t>Mougins, France </a:t>
             </a:r>
           </a:p>
           <a:p>
             <a:pPr algn="ctr"/>
             <a:r>
               <a:rPr lang="en-US" sz="3600" dirty="0" smtClean="0"/>
-              <a:t>a</a:t>
-            </a:r>
-            <a:r>
-              <a:rPr lang="en-US" sz="3600" dirty="0" smtClean="0"/>
-              <a:t>hmad.assaf@sap.com </a:t>
-            </a:r>
-            <a:endParaRPr lang="en-US" sz="3600" dirty="0" smtClean="0"/>
+              <a:t>ahmad.assaf@sap.com </a:t>
+            </a:r>
           </a:p>
           <a:p>
             <a:pPr algn="ctr"/>
@@ -3573,7 +3556,7 @@
         </p:nvSpPr>
         <p:spPr>
           <a:xfrm>
-            <a:off x="1174750" y="19583400"/>
+            <a:off x="1174750" y="20515117"/>
             <a:ext cx="17329594" cy="3170099"/>
           </a:xfrm>
           <a:prstGeom prst="rect">
@@ -3717,7 +3700,7 @@
           </a:prstGeom>
           <a:noFill/>
           <a:extLst>
-            <a:ext uri="{909E8E84-426E-40dd-AFC4-6F175D3DCCD1}">
+            <a:ext uri="{909E8E84-426E-40DD-AFC4-6F175D3DCCD1}">
               <a14:hiddenFill xmlns:a14="http://schemas.microsoft.com/office/drawing/2010/main" xmlns="">
                 <a:solidFill>
                   <a:srgbClr val="FFFFFF"/>
@@ -3735,7 +3718,7 @@
         </p:nvGrpSpPr>
         <p:grpSpPr>
           <a:xfrm>
-            <a:off x="1022350" y="12344400"/>
+            <a:off x="1022350" y="13030200"/>
             <a:ext cx="1371600" cy="838200"/>
             <a:chOff x="8108950" y="13563600"/>
             <a:chExt cx="1371600" cy="838200"/>
@@ -3834,7 +3817,7 @@
         </p:nvSpPr>
         <p:spPr>
           <a:xfrm>
-            <a:off x="2012950" y="12378779"/>
+            <a:off x="2012950" y="13064579"/>
             <a:ext cx="27432000" cy="1446550"/>
           </a:xfrm>
           <a:prstGeom prst="rect">
@@ -3870,19 +3853,16 @@
             </a:r>
             <a:r>
               <a:rPr lang="en-US" sz="4400" dirty="0" smtClean="0"/>
-              <a:t>:</a:t>
-            </a:r>
-            <a:r>
-              <a:rPr lang="en-US" sz="4400" dirty="0" smtClean="0"/>
-              <a:t> </a:t>
+              <a:t>: </a:t>
             </a:r>
             <a:r>
               <a:rPr lang="fr-FR" sz="4400" dirty="0" smtClean="0">
-                <a:hlinkClick r:id="rId4"/>
+                <a:solidFill>
+                  <a:srgbClr val="3799F3"/>
+                </a:solidFill>
               </a:rPr>
               <a:t>http://qakis.org/</a:t>
             </a:r>
-            <a:endParaRPr lang="fr-FR" sz="4400" dirty="0" smtClean="0"/>
           </a:p>
           <a:p>
             <a:endParaRPr lang="fr-FR" sz="4400" dirty="0"/>
@@ -3897,7 +3877,7 @@
         </p:nvGrpSpPr>
         <p:grpSpPr>
           <a:xfrm>
-            <a:off x="1022350" y="13563600"/>
+            <a:off x="1022350" y="14249400"/>
             <a:ext cx="1371600" cy="838200"/>
             <a:chOff x="8108950" y="13563600"/>
             <a:chExt cx="1371600" cy="838200"/>
@@ -3996,7 +3976,7 @@
         </p:nvGrpSpPr>
         <p:grpSpPr>
           <a:xfrm>
-            <a:off x="1022350" y="14782800"/>
+            <a:off x="1022350" y="15468600"/>
             <a:ext cx="1371600" cy="838200"/>
             <a:chOff x="8108950" y="13563600"/>
             <a:chExt cx="1371600" cy="838200"/>
@@ -4095,7 +4075,7 @@
         </p:nvSpPr>
         <p:spPr>
           <a:xfrm>
-            <a:off x="2012949" y="13563600"/>
+            <a:off x="2012949" y="14249400"/>
             <a:ext cx="27355801" cy="769441"/>
           </a:xfrm>
           <a:prstGeom prst="rect">
@@ -4123,25 +4103,21 @@
             </a:r>
             <a:r>
               <a:rPr lang="en-US" sz="4400" dirty="0" smtClean="0"/>
-              <a:t>application </a:t>
-            </a:r>
-            <a:r>
-              <a:rPr lang="en-US" sz="4400" dirty="0" smtClean="0"/>
-              <a:t>for a TV program: </a:t>
+              <a:t>application for a TV program: </a:t>
             </a:r>
             <a:r>
               <a:rPr lang="fr-FR" sz="4400" dirty="0" smtClean="0">
-                <a:hlinkClick r:id="rId5"/>
+                <a:solidFill>
+                  <a:srgbClr val="3799F3"/>
+                </a:solidFill>
               </a:rPr>
-              <a:t>http</a:t>
-            </a:r>
-            <a:r>
-              <a:rPr lang="fr-FR" sz="4400" dirty="0" smtClean="0">
-                <a:hlinkClick r:id="rId5"/>
-              </a:rPr>
-              <a:t>://www.linkedtv.eu/demos/linkednews/</a:t>
-            </a:r>
-            <a:endParaRPr lang="fr-FR" sz="4400" dirty="0"/>
+              <a:t>http://www.linkedtv.eu/demos/linkednews/</a:t>
+            </a:r>
+            <a:endParaRPr lang="fr-FR" sz="4400" dirty="0">
+              <a:solidFill>
+                <a:srgbClr val="3799F3"/>
+              </a:solidFill>
+            </a:endParaRPr>
           </a:p>
         </p:txBody>
       </p:sp>
@@ -4153,7 +4129,7 @@
         </p:nvSpPr>
         <p:spPr>
           <a:xfrm>
-            <a:off x="2035840" y="14738498"/>
+            <a:off x="2035840" y="15424298"/>
             <a:ext cx="14759910" cy="769441"/>
           </a:xfrm>
           <a:prstGeom prst="rect">
@@ -4355,10 +4331,10 @@
                   </a:schemeClr>
                 </a:solidFill>
               </a:rPr>
-              <a:t>type and context-dependent (</a:t>
-            </a:r>
-            <a:r>
-              <a:rPr lang="en-US" sz="4000" dirty="0" smtClean="0">
+              <a:t>type and context-dependent (country, query</a:t>
+            </a:r>
+            <a:r>
+              <a:rPr lang="en-US" sz="4000" dirty="0">
                 <a:solidFill>
                   <a:schemeClr val="tx1">
                     <a:lumMod val="50000"/>
@@ -4366,10 +4342,10 @@
                   </a:schemeClr>
                 </a:solidFill>
               </a:rPr>
-              <a:t>country, query</a:t>
-            </a:r>
-            <a:r>
-              <a:rPr lang="en-US" sz="4000" dirty="0">
+              <a:t>, time, </a:t>
+            </a:r>
+            <a:r>
+              <a:rPr lang="en-US" sz="4000" dirty="0" smtClean="0">
                 <a:solidFill>
                   <a:schemeClr val="tx1">
                     <a:lumMod val="50000"/>
@@ -4377,10 +4353,10 @@
                   </a:schemeClr>
                 </a:solidFill>
               </a:rPr>
-              <a:t>, time, </a:t>
-            </a:r>
-            <a:r>
-              <a:rPr lang="en-US" sz="4000" dirty="0" smtClean="0">
+              <a:t>etc.) which affect </a:t>
+            </a:r>
+            <a:r>
+              <a:rPr lang="en-US" sz="4000" dirty="0">
                 <a:solidFill>
                   <a:schemeClr val="tx1">
                     <a:lumMod val="50000"/>
@@ -4388,17 +4364,6 @@
                   </a:schemeClr>
                 </a:solidFill>
               </a:rPr>
-              <a:t>etc.) which affect </a:t>
-            </a:r>
-            <a:r>
-              <a:rPr lang="en-US" sz="4000" dirty="0">
-                <a:solidFill>
-                  <a:schemeClr val="tx1">
-                    <a:lumMod val="50000"/>
-                    <a:lumOff val="50000"/>
-                  </a:schemeClr>
-                </a:solidFill>
-              </a:rPr>
               <a:t>the results</a:t>
             </a:r>
           </a:p>
@@ -4412,7 +4377,7 @@
         </p:nvSpPr>
         <p:spPr>
           <a:xfrm>
-            <a:off x="9175750" y="22191887"/>
+            <a:off x="9175750" y="23123604"/>
             <a:ext cx="13955940" cy="1107996"/>
           </a:xfrm>
           <a:prstGeom prst="rect">
@@ -4459,7 +4424,7 @@
         </p:nvSpPr>
         <p:spPr>
           <a:xfrm>
-            <a:off x="13823950" y="22534602"/>
+            <a:off x="13823950" y="23466319"/>
             <a:ext cx="228600" cy="553998"/>
           </a:xfrm>
           <a:prstGeom prst="chevron">
@@ -4509,7 +4474,7 @@
         </p:nvSpPr>
         <p:spPr>
           <a:xfrm>
-            <a:off x="13608493" y="22534602"/>
+            <a:off x="13608493" y="23466319"/>
             <a:ext cx="228600" cy="553998"/>
           </a:xfrm>
           <a:prstGeom prst="chevron">
@@ -4559,7 +4524,7 @@
         </p:nvSpPr>
         <p:spPr>
           <a:xfrm>
-            <a:off x="1029291" y="23850600"/>
+            <a:off x="1029291" y="24238089"/>
             <a:ext cx="17329594" cy="5632311"/>
           </a:xfrm>
           <a:prstGeom prst="rect">
@@ -4621,11 +4586,7 @@
             </a:r>
             <a:r>
               <a:rPr lang="en-US" sz="4000" dirty="0" smtClean="0"/>
-              <a:t>a browser User </a:t>
-            </a:r>
-            <a:r>
-              <a:rPr lang="en-US" sz="4000" dirty="0" smtClean="0"/>
-              <a:t>Agent</a:t>
+              <a:t>a browser User Agent</a:t>
             </a:r>
           </a:p>
           <a:p>
@@ -4705,11 +4666,7 @@
             </a:pPr>
             <a:r>
               <a:rPr lang="en-US" sz="4000" dirty="0" smtClean="0"/>
-              <a:t>If we do not find a GKP in a </a:t>
-            </a:r>
-            <a:r>
-              <a:rPr lang="en-US" sz="4000" dirty="0" smtClean="0"/>
-              <a:t>SERP, we </a:t>
+              <a:t>If we do not find a GKP in a SERP, we </a:t>
             </a:r>
             <a:r>
               <a:rPr lang="en-US" sz="4000" dirty="0"/>
@@ -4768,7 +4725,7 @@
           <p:nvPr/>
         </p:nvPicPr>
         <p:blipFill>
-          <a:blip r:embed="rId6" cstate="print">
+          <a:blip r:embed="rId4" cstate="print">
             <a:extLst>
               <a:ext uri="{28A0092B-C50C-407E-A947-70E740481C1C}">
                 <a14:useLocalDpi xmlns:a14="http://schemas.microsoft.com/office/drawing/2010/main" xmlns="" val="0"/>
@@ -4794,14 +4751,14 @@
           </a:ln>
           <a:effectLst/>
           <a:extLst>
-            <a:ext uri="{909E8E84-426E-40dd-AFC4-6F175D3DCCD1}">
+            <a:ext uri="{909E8E84-426E-40DD-AFC4-6F175D3DCCD1}">
               <a14:hiddenFill xmlns:a14="http://schemas.microsoft.com/office/drawing/2010/main" xmlns="">
                 <a:solidFill>
                   <a:schemeClr val="accent1"/>
                 </a:solidFill>
               </a14:hiddenFill>
             </a:ext>
-            <a:ext uri="{91240B29-F687-4f45-9708-019B960494DF}">
+            <a:ext uri="{91240B29-F687-4F45-9708-019B960494DF}">
               <a14:hiddenLine xmlns:a14="http://schemas.microsoft.com/office/drawing/2010/main" xmlns="" w="9525">
                 <a:solidFill>
                   <a:schemeClr val="tx1"/>
@@ -4811,7 +4768,7 @@
                 <a:tailEnd/>
               </a14:hiddenLine>
             </a:ext>
-            <a:ext uri="{AF507438-7753-43e0-B8FC-AC1667EBCBE1}">
+            <a:ext uri="{AF507438-7753-43E0-B8FC-AC1667EBCBE1}">
               <a14:hiddenEffects xmlns:a14="http://schemas.microsoft.com/office/drawing/2010/main" xmlns="">
                 <a:effectLst>
                   <a:outerShdw dist="35921" dir="2700000" algn="ctr" rotWithShape="0">
@@ -5459,7 +5416,7 @@
           <p:nvPr/>
         </p:nvPicPr>
         <p:blipFill>
-          <a:blip r:embed="rId7" cstate="print">
+          <a:blip r:embed="rId5" cstate="print">
             <a:extLst>
               <a:ext uri="{28A0092B-C50C-407E-A947-70E740481C1C}">
                 <a14:useLocalDpi xmlns:a14="http://schemas.microsoft.com/office/drawing/2010/main" xmlns="" val="0"/>
@@ -5473,7 +5430,7 @@
         </p:blipFill>
         <p:spPr bwMode="auto">
           <a:xfrm>
-            <a:off x="19386550" y="32950071"/>
+            <a:off x="19386550" y="32537400"/>
             <a:ext cx="6597729" cy="6597729"/>
           </a:xfrm>
           <a:prstGeom prst="rect">
@@ -5481,7 +5438,7 @@
           </a:prstGeom>
           <a:noFill/>
           <a:extLst>
-            <a:ext uri="{909E8E84-426E-40dd-AFC4-6F175D3DCCD1}">
+            <a:ext uri="{909E8E84-426E-40DD-AFC4-6F175D3DCCD1}">
               <a14:hiddenFill xmlns:a14="http://schemas.microsoft.com/office/drawing/2010/main" xmlns="">
                 <a:solidFill>
                   <a:srgbClr val="FFFFFF"/>
@@ -5499,7 +5456,7 @@
         </p:nvSpPr>
         <p:spPr>
           <a:xfrm>
-            <a:off x="15773086" y="39222402"/>
+            <a:off x="15728950" y="38287404"/>
             <a:ext cx="13955940" cy="1107996"/>
           </a:xfrm>
           <a:prstGeom prst="rect">
@@ -5546,7 +5503,7 @@
         </p:nvSpPr>
         <p:spPr>
           <a:xfrm>
-            <a:off x="15773086" y="40040004"/>
+            <a:off x="15773086" y="38938200"/>
             <a:ext cx="13955940" cy="1107996"/>
           </a:xfrm>
           <a:prstGeom prst="rect">
@@ -5593,7 +5550,7 @@
         </p:nvSpPr>
         <p:spPr>
           <a:xfrm>
-            <a:off x="20453350" y="31734204"/>
+            <a:off x="20453350" y="31546800"/>
             <a:ext cx="13955940" cy="1107996"/>
           </a:xfrm>
           <a:prstGeom prst="rect">
@@ -5687,7 +5644,7 @@
         </p:nvSpPr>
         <p:spPr>
           <a:xfrm>
-            <a:off x="11374210" y="31658004"/>
+            <a:off x="11374210" y="31470600"/>
             <a:ext cx="13955940" cy="1107996"/>
           </a:xfrm>
           <a:prstGeom prst="rect">
@@ -5781,8 +5738,8 @@
         </p:nvSpPr>
         <p:spPr>
           <a:xfrm>
-            <a:off x="793750" y="33451800"/>
-            <a:ext cx="14288181" cy="6247864"/>
+            <a:off x="874939" y="31743432"/>
+            <a:ext cx="13411200" cy="7478970"/>
           </a:xfrm>
           <a:prstGeom prst="rect">
             <a:avLst/>
@@ -5801,15 +5758,7 @@
             </a:pPr>
             <a:r>
               <a:rPr lang="en-US" sz="4000" dirty="0" smtClean="0"/>
-              <a:t>We </a:t>
-            </a:r>
-            <a:r>
-              <a:rPr lang="en-US" sz="4000" dirty="0" smtClean="0"/>
-              <a:t>empirically </a:t>
-            </a:r>
-            <a:r>
-              <a:rPr lang="en-US" sz="4000" dirty="0" smtClean="0"/>
-              <a:t>define </a:t>
+              <a:t>We empirically define </a:t>
             </a:r>
             <a:r>
               <a:rPr lang="en-US" sz="4000" dirty="0"/>
@@ -5858,11 +5807,7 @@
             </a:r>
             <a:r>
               <a:rPr lang="en-US" sz="4000" dirty="0" smtClean="0"/>
-              <a:t>top level countries and </a:t>
-            </a:r>
-            <a:r>
-              <a:rPr lang="en-US" sz="4000" dirty="0" smtClean="0"/>
-              <a:t>time</a:t>
+              <a:t>top level countries and time</a:t>
             </a:r>
           </a:p>
           <a:p>
@@ -5922,6 +5867,174 @@
               <a:t>longer period</a:t>
             </a:r>
             <a:endParaRPr lang="en-US" sz="4000" dirty="0"/>
+          </a:p>
+        </p:txBody>
+      </p:sp>
+      <p:sp>
+        <p:nvSpPr>
+          <p:cNvPr id="56" name="TextBox 55"/>
+          <p:cNvSpPr txBox="1"/>
+          <p:nvPr/>
+        </p:nvSpPr>
+        <p:spPr>
+          <a:xfrm>
+            <a:off x="946150" y="11960094"/>
+            <a:ext cx="27432000" cy="769441"/>
+          </a:xfrm>
+          <a:prstGeom prst="rect">
+            <a:avLst/>
+          </a:prstGeom>
+          <a:noFill/>
+        </p:spPr>
+        <p:txBody>
+          <a:bodyPr wrap="square" rtlCol="0">
+            <a:spAutoFit/>
+          </a:bodyPr>
+          <a:lstStyle/>
+          <a:p>
+            <a:r>
+              <a:rPr lang="en-US" sz="4400" b="1" dirty="0" smtClean="0"/>
+              <a:t>Motivation</a:t>
+            </a:r>
+            <a:endParaRPr lang="fr-FR" sz="4400" b="1" dirty="0"/>
+          </a:p>
+        </p:txBody>
+      </p:sp>
+      <p:sp>
+        <p:nvSpPr>
+          <p:cNvPr id="57" name="TextBox 56"/>
+          <p:cNvSpPr txBox="1"/>
+          <p:nvPr/>
+        </p:nvSpPr>
+        <p:spPr>
+          <a:xfrm>
+            <a:off x="1022350" y="19347358"/>
+            <a:ext cx="27432000" cy="769441"/>
+          </a:xfrm>
+          <a:prstGeom prst="rect">
+            <a:avLst/>
+          </a:prstGeom>
+          <a:noFill/>
+        </p:spPr>
+        <p:txBody>
+          <a:bodyPr wrap="square" rtlCol="0">
+            <a:spAutoFit/>
+          </a:bodyPr>
+          <a:lstStyle/>
+          <a:p>
+            <a:r>
+              <a:rPr lang="en-US" sz="4400" b="1" dirty="0" smtClean="0"/>
+              <a:t>Reverse Engineering the Knowledge Graph</a:t>
+            </a:r>
+            <a:endParaRPr lang="fr-FR" sz="4400" b="1" dirty="0"/>
+          </a:p>
+        </p:txBody>
+      </p:sp>
+      <p:sp>
+        <p:nvSpPr>
+          <p:cNvPr id="58" name="TextBox 57"/>
+          <p:cNvSpPr txBox="1"/>
+          <p:nvPr/>
+        </p:nvSpPr>
+        <p:spPr>
+          <a:xfrm>
+            <a:off x="10712463" y="29008755"/>
+            <a:ext cx="27432000" cy="584775"/>
+          </a:xfrm>
+          <a:prstGeom prst="rect">
+            <a:avLst/>
+          </a:prstGeom>
+          <a:noFill/>
+        </p:spPr>
+        <p:txBody>
+          <a:bodyPr wrap="square" rtlCol="0">
+            <a:spAutoFit/>
+          </a:bodyPr>
+          <a:lstStyle/>
+          <a:p>
+            <a:pPr algn="ctr"/>
+            <a:r>
+              <a:rPr lang="en-US" sz="3200" b="1" dirty="0" smtClean="0"/>
+              <a:t>Google’s Knowledge Panel (GKP) for Greece </a:t>
+            </a:r>
+            <a:endParaRPr lang="fr-FR" sz="3200" b="1" dirty="0"/>
+          </a:p>
+        </p:txBody>
+      </p:sp>
+      <p:sp>
+        <p:nvSpPr>
+          <p:cNvPr id="59" name="TextBox 58"/>
+          <p:cNvSpPr txBox="1"/>
+          <p:nvPr/>
+        </p:nvSpPr>
+        <p:spPr>
+          <a:xfrm>
+            <a:off x="1152842" y="40233600"/>
+            <a:ext cx="28576183" cy="2123658"/>
+          </a:xfrm>
+          <a:prstGeom prst="rect">
+            <a:avLst/>
+          </a:prstGeom>
+          <a:noFill/>
+        </p:spPr>
+        <p:txBody>
+          <a:bodyPr wrap="square" rtlCol="0">
+            <a:spAutoFit/>
+          </a:bodyPr>
+          <a:lstStyle/>
+          <a:p>
+            <a:r>
+              <a:rPr lang="en-US" sz="4400" b="1" dirty="0" smtClean="0"/>
+              <a:t>By analyzing the results of the survey we discovered that concepts like </a:t>
+            </a:r>
+            <a:r>
+              <a:rPr lang="en-US" sz="4400" b="1" dirty="0" smtClean="0">
+                <a:solidFill>
+                  <a:srgbClr val="3799F3"/>
+                </a:solidFill>
+              </a:rPr>
+              <a:t>Book</a:t>
+            </a:r>
+            <a:r>
+              <a:rPr lang="en-US" sz="4400" b="1" dirty="0" smtClean="0"/>
+              <a:t> and </a:t>
+            </a:r>
+            <a:r>
+              <a:rPr lang="en-US" sz="4400" b="1" dirty="0" smtClean="0">
+                <a:solidFill>
+                  <a:srgbClr val="3799F3"/>
+                </a:solidFill>
+              </a:rPr>
+              <a:t>Museum</a:t>
+            </a:r>
+            <a:r>
+              <a:rPr lang="en-US" sz="4400" b="1" dirty="0" smtClean="0"/>
+              <a:t> are pretty stable (in agreement) compared to other concepts like </a:t>
+            </a:r>
+            <a:r>
+              <a:rPr lang="en-US" sz="4400" b="1" dirty="0" smtClean="0">
+                <a:solidFill>
+                  <a:srgbClr val="3799F3"/>
+                </a:solidFill>
+              </a:rPr>
+              <a:t>Person/Agent</a:t>
+            </a:r>
+          </a:p>
+          <a:p>
+            <a:r>
+              <a:rPr lang="en-US" sz="4400" b="1" dirty="0" smtClean="0"/>
+              <a:t>All results are reproducible from our code base at </a:t>
+            </a:r>
+            <a:r>
+              <a:rPr lang="en-US" sz="4400" b="1" dirty="0" smtClean="0">
+                <a:hlinkClick r:id="rId6"/>
+              </a:rPr>
+              <a:t>https://github.com/ahmadassaf/KBE</a:t>
+            </a:r>
+            <a:r>
+              <a:rPr lang="en-US" sz="4400" b="1" dirty="0" smtClean="0"/>
+              <a:t> </a:t>
+            </a:r>
           </a:p>
         </p:txBody>
       </p:sp>

</xml_diff>

<commit_message>
Add logo of funding projects
</commit_message>
<xml_diff>
--- a/poster/eswc2014-poster.pptx
+++ b/poster/eswc2014-poster.pptx
@@ -341,7 +341,7 @@
     </p:spTree>
     <p:extLst>
       <p:ext uri="{BB962C8B-B14F-4D97-AF65-F5344CB8AC3E}">
-        <p14:creationId xmlns:p14="http://schemas.microsoft.com/office/powerpoint/2010/main" xmlns="" val="3498610242"/>
+        <p14:creationId xmlns="" xmlns:p14="http://schemas.microsoft.com/office/powerpoint/2010/main" val="3498610242"/>
       </p:ext>
     </p:extLst>
   </p:cSld>
@@ -513,7 +513,7 @@
     </p:spTree>
     <p:extLst>
       <p:ext uri="{BB962C8B-B14F-4D97-AF65-F5344CB8AC3E}">
-        <p14:creationId xmlns:p14="http://schemas.microsoft.com/office/powerpoint/2010/main" xmlns="" val="3408886510"/>
+        <p14:creationId xmlns="" xmlns:p14="http://schemas.microsoft.com/office/powerpoint/2010/main" val="3408886510"/>
       </p:ext>
     </p:extLst>
   </p:cSld>
@@ -695,7 +695,7 @@
     </p:spTree>
     <p:extLst>
       <p:ext uri="{BB962C8B-B14F-4D97-AF65-F5344CB8AC3E}">
-        <p14:creationId xmlns:p14="http://schemas.microsoft.com/office/powerpoint/2010/main" xmlns="" val="3220719012"/>
+        <p14:creationId xmlns="" xmlns:p14="http://schemas.microsoft.com/office/powerpoint/2010/main" val="3220719012"/>
       </p:ext>
     </p:extLst>
   </p:cSld>
@@ -867,7 +867,7 @@
     </p:spTree>
     <p:extLst>
       <p:ext uri="{BB962C8B-B14F-4D97-AF65-F5344CB8AC3E}">
-        <p14:creationId xmlns:p14="http://schemas.microsoft.com/office/powerpoint/2010/main" xmlns="" val="234576983"/>
+        <p14:creationId xmlns="" xmlns:p14="http://schemas.microsoft.com/office/powerpoint/2010/main" val="234576983"/>
       </p:ext>
     </p:extLst>
   </p:cSld>
@@ -1115,7 +1115,7 @@
     </p:spTree>
     <p:extLst>
       <p:ext uri="{BB962C8B-B14F-4D97-AF65-F5344CB8AC3E}">
-        <p14:creationId xmlns:p14="http://schemas.microsoft.com/office/powerpoint/2010/main" xmlns="" val="2455031330"/>
+        <p14:creationId xmlns="" xmlns:p14="http://schemas.microsoft.com/office/powerpoint/2010/main" val="2455031330"/>
       </p:ext>
     </p:extLst>
   </p:cSld>
@@ -1405,7 +1405,7 @@
     </p:spTree>
     <p:extLst>
       <p:ext uri="{BB962C8B-B14F-4D97-AF65-F5344CB8AC3E}">
-        <p14:creationId xmlns:p14="http://schemas.microsoft.com/office/powerpoint/2010/main" xmlns="" val="3551008444"/>
+        <p14:creationId xmlns="" xmlns:p14="http://schemas.microsoft.com/office/powerpoint/2010/main" val="3551008444"/>
       </p:ext>
     </p:extLst>
   </p:cSld>
@@ -1834,7 +1834,7 @@
     </p:spTree>
     <p:extLst>
       <p:ext uri="{BB962C8B-B14F-4D97-AF65-F5344CB8AC3E}">
-        <p14:creationId xmlns:p14="http://schemas.microsoft.com/office/powerpoint/2010/main" xmlns="" val="2621549410"/>
+        <p14:creationId xmlns="" xmlns:p14="http://schemas.microsoft.com/office/powerpoint/2010/main" val="2621549410"/>
       </p:ext>
     </p:extLst>
   </p:cSld>
@@ -1954,7 +1954,7 @@
     </p:spTree>
     <p:extLst>
       <p:ext uri="{BB962C8B-B14F-4D97-AF65-F5344CB8AC3E}">
-        <p14:creationId xmlns:p14="http://schemas.microsoft.com/office/powerpoint/2010/main" xmlns="" val="2337226835"/>
+        <p14:creationId xmlns="" xmlns:p14="http://schemas.microsoft.com/office/powerpoint/2010/main" val="2337226835"/>
       </p:ext>
     </p:extLst>
   </p:cSld>
@@ -2051,7 +2051,7 @@
     </p:spTree>
     <p:extLst>
       <p:ext uri="{BB962C8B-B14F-4D97-AF65-F5344CB8AC3E}">
-        <p14:creationId xmlns:p14="http://schemas.microsoft.com/office/powerpoint/2010/main" xmlns="" val="3450073293"/>
+        <p14:creationId xmlns="" xmlns:p14="http://schemas.microsoft.com/office/powerpoint/2010/main" val="3450073293"/>
       </p:ext>
     </p:extLst>
   </p:cSld>
@@ -2330,7 +2330,7 @@
     </p:spTree>
     <p:extLst>
       <p:ext uri="{BB962C8B-B14F-4D97-AF65-F5344CB8AC3E}">
-        <p14:creationId xmlns:p14="http://schemas.microsoft.com/office/powerpoint/2010/main" xmlns="" val="2517025264"/>
+        <p14:creationId xmlns="" xmlns:p14="http://schemas.microsoft.com/office/powerpoint/2010/main" val="2517025264"/>
       </p:ext>
     </p:extLst>
   </p:cSld>
@@ -2585,7 +2585,7 @@
     </p:spTree>
     <p:extLst>
       <p:ext uri="{BB962C8B-B14F-4D97-AF65-F5344CB8AC3E}">
-        <p14:creationId xmlns:p14="http://schemas.microsoft.com/office/powerpoint/2010/main" xmlns="" val="3855469034"/>
+        <p14:creationId xmlns="" xmlns:p14="http://schemas.microsoft.com/office/powerpoint/2010/main" val="3855469034"/>
       </p:ext>
     </p:extLst>
   </p:cSld>
@@ -2836,7 +2836,7 @@
     </p:spTree>
     <p:extLst>
       <p:ext uri="{BB962C8B-B14F-4D97-AF65-F5344CB8AC3E}">
-        <p14:creationId xmlns:p14="http://schemas.microsoft.com/office/powerpoint/2010/main" xmlns="" val="1581356310"/>
+        <p14:creationId xmlns="" xmlns:p14="http://schemas.microsoft.com/office/powerpoint/2010/main" val="1581356310"/>
       </p:ext>
     </p:extLst>
   </p:cSld>
@@ -3124,21 +3124,54 @@
           <a:chExt cx="0" cy="0"/>
         </a:xfrm>
       </p:grpSpPr>
-      <p:sp>
-        <p:nvSpPr>
-          <p:cNvPr id="14" name="TextBox 13"/>
-          <p:cNvSpPr txBox="1"/>
+      <p:pic>
+        <p:nvPicPr>
+          <p:cNvPr id="1027" name="Picture 3"/>
+          <p:cNvPicPr>
+            <a:picLocks noChangeAspect="1" noChangeArrowheads="1"/>
+          </p:cNvPicPr>
           <p:nvPr/>
-        </p:nvSpPr>
-        <p:spPr>
-          <a:xfrm>
-            <a:off x="15337971" y="4452878"/>
-            <a:ext cx="13116379" cy="2308324"/>
+        </p:nvPicPr>
+        <p:blipFill>
+          <a:blip r:embed="rId2" cstate="print"/>
+          <a:srcRect/>
+          <a:stretch>
+            <a:fillRect/>
+          </a:stretch>
+        </p:blipFill>
+        <p:spPr bwMode="auto">
+          <a:xfrm>
+            <a:off x="26625550" y="4343400"/>
+            <a:ext cx="2743200" cy="2743200"/>
           </a:xfrm>
           <a:prstGeom prst="rect">
             <a:avLst/>
           </a:prstGeom>
           <a:noFill/>
+          <a:ln w="9525">
+            <a:noFill/>
+            <a:miter lim="800000"/>
+            <a:headEnd/>
+            <a:tailEnd/>
+          </a:ln>
+          <a:effectLst/>
+        </p:spPr>
+      </p:pic>
+      <p:sp>
+        <p:nvSpPr>
+          <p:cNvPr id="14" name="TextBox 13"/>
+          <p:cNvSpPr txBox="1"/>
+          <p:nvPr/>
+        </p:nvSpPr>
+        <p:spPr>
+          <a:xfrm>
+            <a:off x="15337971" y="5103674"/>
+            <a:ext cx="13116379" cy="1754326"/>
+          </a:xfrm>
+          <a:prstGeom prst="rect">
+            <a:avLst/>
+          </a:prstGeom>
+          <a:noFill/>
         </p:spPr>
         <p:txBody>
           <a:bodyPr wrap="square" rtlCol="0">
@@ -3147,13 +3180,13 @@
           <a:lstStyle/>
           <a:p>
             <a:pPr algn="ctr"/>
-            <a:endParaRPr lang="en-US" sz="3600" dirty="0" smtClean="0"/>
-          </a:p>
-          <a:p>
-            <a:pPr algn="ctr"/>
             <a:r>
               <a:rPr lang="en-US" sz="3600" dirty="0" smtClean="0"/>
-              <a:t>‡EURECOM </a:t>
+              <a:t>‡</a:t>
+            </a:r>
+            <a:r>
+              <a:rPr lang="en-US" sz="3600" dirty="0" smtClean="0"/>
+              <a:t>EURECOM </a:t>
             </a:r>
           </a:p>
           <a:p>
@@ -3182,10 +3215,10 @@
           <p:nvPr/>
         </p:nvPicPr>
         <p:blipFill>
-          <a:blip r:embed="rId2" cstate="print">
+          <a:blip r:embed="rId3" cstate="print">
             <a:extLst>
               <a:ext uri="{28A0092B-C50C-407E-A947-70E740481C1C}">
-                <a14:useLocalDpi xmlns:a14="http://schemas.microsoft.com/office/drawing/2010/main" xmlns="" val="0"/>
+                <a14:useLocalDpi xmlns="" xmlns:a14="http://schemas.microsoft.com/office/drawing/2010/main" val="0"/>
               </a:ext>
             </a:extLst>
           </a:blip>
@@ -3328,58 +3361,58 @@
           <a:p>
             <a:pPr algn="ctr"/>
             <a:r>
-              <a:rPr lang="en-US" sz="4800" smtClean="0"/>
+              <a:rPr lang="en-US" sz="4800" dirty="0" smtClean="0"/>
               <a:t>Ahmad </a:t>
             </a:r>
             <a:r>
-              <a:rPr lang="en-US" sz="4800" err="1" smtClean="0"/>
+              <a:rPr lang="en-US" sz="4800" dirty="0" err="1" smtClean="0"/>
               <a:t>Assaf</a:t>
             </a:r>
             <a:r>
-              <a:rPr lang="en-US" sz="4800" smtClean="0"/>
+              <a:rPr lang="en-US" sz="4800" dirty="0" smtClean="0"/>
               <a:t>†, </a:t>
             </a:r>
             <a:r>
-              <a:rPr lang="fr-FR" sz="4800" smtClean="0"/>
+              <a:rPr lang="fr-FR" sz="4800" dirty="0" smtClean="0"/>
               <a:t>Ghislain A. </a:t>
             </a:r>
             <a:r>
-              <a:rPr lang="fr-FR" sz="4800" err="1" smtClean="0"/>
+              <a:rPr lang="fr-FR" sz="4800" dirty="0" err="1" smtClean="0"/>
               <a:t>Atemezing</a:t>
             </a:r>
             <a:r>
-              <a:rPr lang="en-US" sz="4800" smtClean="0"/>
+              <a:rPr lang="en-US" sz="4800" dirty="0" smtClean="0"/>
               <a:t>‡, </a:t>
             </a:r>
             <a:r>
-              <a:rPr lang="en-US" sz="4800" err="1" smtClean="0"/>
+              <a:rPr lang="en-US" sz="4800" dirty="0" err="1" smtClean="0"/>
               <a:t>Raphaël</a:t>
             </a:r>
             <a:r>
-              <a:rPr lang="en-US" sz="4800"/>
+              <a:rPr lang="en-US" sz="4800" dirty="0"/>
               <a:t> </a:t>
             </a:r>
             <a:r>
-              <a:rPr lang="en-US" sz="4800" err="1"/>
+              <a:rPr lang="en-US" sz="4800" dirty="0" err="1"/>
               <a:t>Troncy</a:t>
             </a:r>
             <a:r>
-              <a:rPr lang="en-US" sz="4800" smtClean="0"/>
+              <a:rPr lang="en-US" sz="4800" dirty="0" smtClean="0"/>
               <a:t>‡ and </a:t>
             </a:r>
             <a:r>
-              <a:rPr lang="fr-FR" sz="4800" smtClean="0"/>
+              <a:rPr lang="fr-FR" sz="4800" dirty="0" smtClean="0"/>
               <a:t>Elena </a:t>
             </a:r>
             <a:r>
-              <a:rPr lang="fr-FR" sz="4800" err="1" smtClean="0"/>
+              <a:rPr lang="fr-FR" sz="4800" dirty="0" err="1" smtClean="0"/>
               <a:t>Cabrio</a:t>
             </a:r>
             <a:r>
-              <a:rPr lang="en-US" sz="4800" smtClean="0"/>
+              <a:rPr lang="en-US" sz="4800" dirty="0" smtClean="0"/>
               <a:t>‡</a:t>
             </a:r>
-            <a:endParaRPr lang="en-US" sz="4800"/>
+            <a:endParaRPr lang="en-US" sz="4800" dirty="0"/>
           </a:p>
         </p:txBody>
       </p:sp>
@@ -3392,7 +3425,7 @@
         <p:spPr>
           <a:xfrm>
             <a:off x="1022350" y="5047833"/>
-            <a:ext cx="13116379" cy="2185214"/>
+            <a:ext cx="13116379" cy="1754326"/>
           </a:xfrm>
           <a:prstGeom prst="rect">
             <a:avLst/>
@@ -3424,10 +3457,6 @@
               <a:rPr lang="en-US" sz="3600" dirty="0" smtClean="0"/>
               <a:t>ahmad.assaf@sap.com </a:t>
             </a:r>
-          </a:p>
-          <a:p>
-            <a:pPr algn="ctr"/>
-            <a:endParaRPr lang="en-US" sz="2800" dirty="0"/>
           </a:p>
         </p:txBody>
       </p:sp>
@@ -3678,10 +3707,10 @@
           <p:nvPr/>
         </p:nvPicPr>
         <p:blipFill>
-          <a:blip r:embed="rId3" cstate="print">
+          <a:blip r:embed="rId4" cstate="print">
             <a:extLst>
               <a:ext uri="{28A0092B-C50C-407E-A947-70E740481C1C}">
-                <a14:useLocalDpi xmlns:a14="http://schemas.microsoft.com/office/drawing/2010/main" xmlns="" val="0"/>
+                <a14:useLocalDpi xmlns="" xmlns:a14="http://schemas.microsoft.com/office/drawing/2010/main" val="0"/>
               </a:ext>
             </a:extLst>
           </a:blip>
@@ -3701,7 +3730,7 @@
           <a:noFill/>
           <a:extLst>
             <a:ext uri="{909E8E84-426E-40DD-AFC4-6F175D3DCCD1}">
-              <a14:hiddenFill xmlns:a14="http://schemas.microsoft.com/office/drawing/2010/main" xmlns="">
+              <a14:hiddenFill xmlns="" xmlns:a14="http://schemas.microsoft.com/office/drawing/2010/main">
                 <a:solidFill>
                   <a:srgbClr val="FFFFFF"/>
                 </a:solidFill>
@@ -4725,10 +4754,10 @@
           <p:nvPr/>
         </p:nvPicPr>
         <p:blipFill>
-          <a:blip r:embed="rId4" cstate="print">
+          <a:blip r:embed="rId5" cstate="print">
             <a:extLst>
               <a:ext uri="{28A0092B-C50C-407E-A947-70E740481C1C}">
-                <a14:useLocalDpi xmlns:a14="http://schemas.microsoft.com/office/drawing/2010/main" xmlns="" val="0"/>
+                <a14:useLocalDpi xmlns="" xmlns:a14="http://schemas.microsoft.com/office/drawing/2010/main" val="0"/>
               </a:ext>
             </a:extLst>
           </a:blip>
@@ -4752,14 +4781,14 @@
           <a:effectLst/>
           <a:extLst>
             <a:ext uri="{909E8E84-426E-40DD-AFC4-6F175D3DCCD1}">
-              <a14:hiddenFill xmlns:a14="http://schemas.microsoft.com/office/drawing/2010/main" xmlns="">
+              <a14:hiddenFill xmlns="" xmlns:a14="http://schemas.microsoft.com/office/drawing/2010/main">
                 <a:solidFill>
                   <a:schemeClr val="accent1"/>
                 </a:solidFill>
               </a14:hiddenFill>
             </a:ext>
             <a:ext uri="{91240B29-F687-4F45-9708-019B960494DF}">
-              <a14:hiddenLine xmlns:a14="http://schemas.microsoft.com/office/drawing/2010/main" xmlns="" w="9525">
+              <a14:hiddenLine xmlns="" xmlns:a14="http://schemas.microsoft.com/office/drawing/2010/main" w="9525">
                 <a:solidFill>
                   <a:schemeClr val="tx1"/>
                 </a:solidFill>
@@ -4769,7 +4798,7 @@
               </a14:hiddenLine>
             </a:ext>
             <a:ext uri="{AF507438-7753-43E0-B8FC-AC1667EBCBE1}">
-              <a14:hiddenEffects xmlns:a14="http://schemas.microsoft.com/office/drawing/2010/main" xmlns="">
+              <a14:hiddenEffects xmlns="" xmlns:a14="http://schemas.microsoft.com/office/drawing/2010/main">
                 <a:effectLst>
                   <a:outerShdw dist="35921" dir="2700000" algn="ctr" rotWithShape="0">
                     <a:schemeClr val="bg2"/>
@@ -5416,10 +5445,10 @@
           <p:nvPr/>
         </p:nvPicPr>
         <p:blipFill>
-          <a:blip r:embed="rId5" cstate="print">
+          <a:blip r:embed="rId6" cstate="print">
             <a:extLst>
               <a:ext uri="{28A0092B-C50C-407E-A947-70E740481C1C}">
-                <a14:useLocalDpi xmlns:a14="http://schemas.microsoft.com/office/drawing/2010/main" xmlns="" val="0"/>
+                <a14:useLocalDpi xmlns="" xmlns:a14="http://schemas.microsoft.com/office/drawing/2010/main" val="0"/>
               </a:ext>
             </a:extLst>
           </a:blip>
@@ -5439,7 +5468,7 @@
           <a:noFill/>
           <a:extLst>
             <a:ext uri="{909E8E84-426E-40DD-AFC4-6F175D3DCCD1}">
-              <a14:hiddenFill xmlns:a14="http://schemas.microsoft.com/office/drawing/2010/main" xmlns="">
+              <a14:hiddenFill xmlns="" xmlns:a14="http://schemas.microsoft.com/office/drawing/2010/main">
                 <a:solidFill>
                   <a:srgbClr val="FFFFFF"/>
                 </a:solidFill>
@@ -6027,7 +6056,7 @@
             </a:r>
             <a:r>
               <a:rPr lang="en-US" sz="4400" b="1" dirty="0" smtClean="0">
-                <a:hlinkClick r:id="rId6"/>
+                <a:hlinkClick r:id="rId7"/>
               </a:rPr>
               <a:t>https://github.com/ahmadassaf/KBE</a:t>
             </a:r>
@@ -6038,10 +6067,43 @@
           </a:p>
         </p:txBody>
       </p:sp>
+      <p:pic>
+        <p:nvPicPr>
+          <p:cNvPr id="5" name="Picture 2"/>
+          <p:cNvPicPr>
+            <a:picLocks noChangeAspect="1" noChangeArrowheads="1"/>
+          </p:cNvPicPr>
+          <p:nvPr/>
+        </p:nvPicPr>
+        <p:blipFill>
+          <a:blip r:embed="rId8" cstate="print"/>
+          <a:srcRect/>
+          <a:stretch>
+            <a:fillRect/>
+          </a:stretch>
+        </p:blipFill>
+        <p:spPr bwMode="auto">
+          <a:xfrm>
+            <a:off x="26549350" y="3104187"/>
+            <a:ext cx="3200400" cy="1410663"/>
+          </a:xfrm>
+          <a:prstGeom prst="rect">
+            <a:avLst/>
+          </a:prstGeom>
+          <a:noFill/>
+          <a:ln w="9525">
+            <a:noFill/>
+            <a:miter lim="800000"/>
+            <a:headEnd/>
+            <a:tailEnd/>
+          </a:ln>
+          <a:effectLst/>
+        </p:spPr>
+      </p:pic>
     </p:spTree>
     <p:extLst>
       <p:ext uri="{BB962C8B-B14F-4D97-AF65-F5344CB8AC3E}">
-        <p14:creationId xmlns:p14="http://schemas.microsoft.com/office/powerpoint/2010/main" xmlns="" val="1783528801"/>
+        <p14:creationId xmlns="" xmlns:p14="http://schemas.microsoft.com/office/powerpoint/2010/main" val="1783528801"/>
       </p:ext>
     </p:extLst>
   </p:cSld>

</xml_diff>